<commit_message>
second commit/machine learning mockup
</commit_message>
<xml_diff>
--- a/machine learning mockup.pptx
+++ b/machine learning mockup.pptx
@@ -7,6 +7,7 @@
   <p:sldIdLst>
     <p:sldId id="256" r:id="rId2"/>
     <p:sldId id="257" r:id="rId3"/>
+    <p:sldId id="258" r:id="rId4"/>
   </p:sldIdLst>
   <p:sldSz cx="12192000" cy="6858000"/>
   <p:notesSz cx="6858000" cy="9144000"/>
@@ -105,6 +106,11 @@
       </a:defRPr>
     </a:lvl9pPr>
   </p:defaultTextStyle>
+  <p:extLst>
+    <p:ext uri="{EFAFB233-063F-42B5-8137-9DF3F51BA10A}">
+      <p15:sldGuideLst xmlns:p15="http://schemas.microsoft.com/office/powerpoint/2012/main"/>
+    </p:ext>
+  </p:extLst>
 </p:presentation>
 </file>
 
@@ -4328,6 +4334,272 @@
 </p:sld>
 </file>
 
+<file path=ppt/slides/slide3.xml><?xml version="1.0" encoding="utf-8"?>
+<p:sld xmlns:a="http://schemas.openxmlformats.org/drawingml/2006/main" xmlns:r="http://schemas.openxmlformats.org/officeDocument/2006/relationships" xmlns:p="http://schemas.openxmlformats.org/presentationml/2006/main">
+  <p:cSld>
+    <p:spTree>
+      <p:nvGrpSpPr>
+        <p:cNvPr id="1" name=""/>
+        <p:cNvGrpSpPr/>
+        <p:nvPr/>
+      </p:nvGrpSpPr>
+      <p:grpSpPr>
+        <a:xfrm>
+          <a:off x="0" y="0"/>
+          <a:ext cx="0" cy="0"/>
+          <a:chOff x="0" y="0"/>
+          <a:chExt cx="0" cy="0"/>
+        </a:xfrm>
+      </p:grpSpPr>
+      <p:sp>
+        <p:nvSpPr>
+          <p:cNvPr id="3" name="Content Placeholder 2">
+            <a:extLst>
+              <a:ext uri="{FF2B5EF4-FFF2-40B4-BE49-F238E27FC236}">
+                <a16:creationId xmlns:a16="http://schemas.microsoft.com/office/drawing/2014/main" id="{923404B4-3DEF-425F-AC58-C200CAB18152}"/>
+              </a:ext>
+            </a:extLst>
+          </p:cNvPr>
+          <p:cNvSpPr>
+            <a:spLocks noGrp="1"/>
+          </p:cNvSpPr>
+          <p:nvPr>
+            <p:ph idx="1"/>
+          </p:nvPr>
+        </p:nvSpPr>
+        <p:spPr>
+          <a:xfrm>
+            <a:off x="1371600" y="745724"/>
+            <a:ext cx="10241280" cy="5325892"/>
+          </a:xfrm>
+        </p:spPr>
+        <p:txBody>
+          <a:bodyPr/>
+          <a:lstStyle/>
+          <a:p>
+            <a:pPr marL="0" lvl="0" indent="0">
+              <a:lnSpc>
+                <a:spcPct val="107000"/>
+              </a:lnSpc>
+              <a:buNone/>
+              <a:tabLst>
+                <a:tab pos="1391285" algn="l"/>
+              </a:tabLst>
+            </a:pPr>
+            <a:endParaRPr lang="en-US" sz="1800" dirty="0">
+              <a:effectLst/>
+              <a:latin typeface="Calibri" panose="020F0502020204030204" pitchFamily="34" charset="0"/>
+              <a:ea typeface="Calibri" panose="020F0502020204030204" pitchFamily="34" charset="0"/>
+              <a:cs typeface="Times New Roman" panose="02020603050405020304" pitchFamily="18" charset="0"/>
+            </a:endParaRPr>
+          </a:p>
+          <a:p>
+            <a:pPr marL="0" lvl="0" indent="0">
+              <a:lnSpc>
+                <a:spcPct val="107000"/>
+              </a:lnSpc>
+              <a:buNone/>
+              <a:tabLst>
+                <a:tab pos="1391285" algn="l"/>
+              </a:tabLst>
+            </a:pPr>
+            <a:r>
+              <a:rPr lang="en-US" sz="1800" dirty="0">
+                <a:latin typeface="Calibri" panose="020F0502020204030204" pitchFamily="34" charset="0"/>
+                <a:ea typeface="Calibri" panose="020F0502020204030204" pitchFamily="34" charset="0"/>
+                <a:cs typeface="Times New Roman" panose="02020603050405020304" pitchFamily="18" charset="0"/>
+              </a:rPr>
+              <a:t>3</a:t>
+            </a:r>
+            <a:r>
+              <a:rPr lang="en-US" sz="1800" dirty="0">
+                <a:effectLst/>
+                <a:ea typeface="Calibri" panose="020F0502020204030204" pitchFamily="34" charset="0"/>
+                <a:cs typeface="Times New Roman" panose="02020603050405020304" pitchFamily="18" charset="0"/>
+              </a:rPr>
+              <a:t>. Build Machine Learning Model using different algorithm </a:t>
+            </a:r>
+          </a:p>
+          <a:p>
+            <a:pPr marL="1257300" lvl="2" indent="-342900">
+              <a:lnSpc>
+                <a:spcPct val="107000"/>
+              </a:lnSpc>
+              <a:buFont typeface="Courier New" panose="02070309020205020404" pitchFamily="49" charset="0"/>
+              <a:buChar char="o"/>
+              <a:tabLst>
+                <a:tab pos="1391285" algn="l"/>
+              </a:tabLst>
+            </a:pPr>
+            <a:r>
+              <a:rPr lang="en-US" sz="1600" dirty="0">
+                <a:effectLst/>
+                <a:ea typeface="Calibri" panose="020F0502020204030204" pitchFamily="34" charset="0"/>
+                <a:cs typeface="Times New Roman" panose="02020603050405020304" pitchFamily="18" charset="0"/>
+              </a:rPr>
+              <a:t>Create home features: home location, home type, sqfeet, number of beds, number of bathrooms, etc.</a:t>
+            </a:r>
+          </a:p>
+          <a:p>
+            <a:pPr marL="1257300" lvl="2" indent="-342900">
+              <a:lnSpc>
+                <a:spcPct val="107000"/>
+              </a:lnSpc>
+              <a:buFont typeface="Courier New" panose="02070309020205020404" pitchFamily="49" charset="0"/>
+              <a:buChar char="o"/>
+              <a:tabLst>
+                <a:tab pos="1391285" algn="l"/>
+              </a:tabLst>
+            </a:pPr>
+            <a:r>
+              <a:rPr lang="en-US" sz="1600" dirty="0">
+                <a:effectLst/>
+                <a:ea typeface="Calibri" panose="020F0502020204030204" pitchFamily="34" charset="0"/>
+                <a:cs typeface="Times New Roman" panose="02020603050405020304" pitchFamily="18" charset="0"/>
+              </a:rPr>
+              <a:t>Define our target: rental price (numerical value)</a:t>
+            </a:r>
+          </a:p>
+          <a:p>
+            <a:pPr marL="1257300" lvl="2" indent="-342900">
+              <a:lnSpc>
+                <a:spcPct val="107000"/>
+              </a:lnSpc>
+              <a:buFont typeface="Courier New" panose="02070309020205020404" pitchFamily="49" charset="0"/>
+              <a:buChar char="o"/>
+              <a:tabLst>
+                <a:tab pos="1391285" algn="l"/>
+              </a:tabLst>
+            </a:pPr>
+            <a:r>
+              <a:rPr lang="en-US" sz="1600" dirty="0">
+                <a:effectLst/>
+                <a:ea typeface="Calibri" panose="020F0502020204030204" pitchFamily="34" charset="0"/>
+                <a:cs typeface="Times New Roman" panose="02020603050405020304" pitchFamily="18" charset="0"/>
+              </a:rPr>
+              <a:t>Train data and test data</a:t>
+            </a:r>
+          </a:p>
+          <a:p>
+            <a:pPr marL="1257300" lvl="2" indent="-342900">
+              <a:lnSpc>
+                <a:spcPct val="107000"/>
+              </a:lnSpc>
+              <a:buFont typeface="Courier New" panose="02070309020205020404" pitchFamily="49" charset="0"/>
+              <a:buChar char="o"/>
+              <a:tabLst>
+                <a:tab pos="1391285" algn="l"/>
+              </a:tabLst>
+            </a:pPr>
+            <a:r>
+              <a:rPr lang="en-US" sz="1600" dirty="0">
+                <a:effectLst/>
+                <a:ea typeface="Calibri" panose="020F0502020204030204" pitchFamily="34" charset="0"/>
+                <a:cs typeface="Times New Roman" panose="02020603050405020304" pitchFamily="18" charset="0"/>
+              </a:rPr>
+              <a:t>Performance evaluation: Our aim on this dataset is to achieve an accuracy score of 85% or plus.</a:t>
+            </a:r>
+          </a:p>
+          <a:p>
+            <a:pPr marL="1257300" lvl="2" indent="-342900">
+              <a:lnSpc>
+                <a:spcPct val="107000"/>
+              </a:lnSpc>
+              <a:spcAft>
+                <a:spcPts val="800"/>
+              </a:spcAft>
+              <a:buFont typeface="Courier New" panose="02070309020205020404" pitchFamily="49" charset="0"/>
+              <a:buChar char="o"/>
+              <a:tabLst>
+                <a:tab pos="1391285" algn="l"/>
+              </a:tabLst>
+            </a:pPr>
+            <a:r>
+              <a:rPr lang="en-US" sz="1600" dirty="0">
+                <a:effectLst/>
+                <a:ea typeface="Calibri" panose="020F0502020204030204" pitchFamily="34" charset="0"/>
+                <a:cs typeface="Times New Roman" panose="02020603050405020304" pitchFamily="18" charset="0"/>
+              </a:rPr>
+              <a:t>Deployment </a:t>
+            </a:r>
+          </a:p>
+          <a:p>
+            <a:pPr marL="1257300" lvl="2" indent="-342900">
+              <a:lnSpc>
+                <a:spcPct val="107000"/>
+              </a:lnSpc>
+              <a:spcAft>
+                <a:spcPts val="800"/>
+              </a:spcAft>
+              <a:buFont typeface="Courier New" panose="02070309020205020404" pitchFamily="49" charset="0"/>
+              <a:buChar char="o"/>
+              <a:tabLst>
+                <a:tab pos="1391285" algn="l"/>
+              </a:tabLst>
+            </a:pPr>
+            <a:endParaRPr lang="en-US" sz="1600" dirty="0">
+              <a:ea typeface="Calibri" panose="020F0502020204030204" pitchFamily="34" charset="0"/>
+              <a:cs typeface="Times New Roman" panose="02020603050405020304" pitchFamily="18" charset="0"/>
+            </a:endParaRPr>
+          </a:p>
+          <a:p>
+            <a:pPr marL="914400" lvl="2" indent="0">
+              <a:lnSpc>
+                <a:spcPct val="107000"/>
+              </a:lnSpc>
+              <a:spcAft>
+                <a:spcPts val="800"/>
+              </a:spcAft>
+              <a:buNone/>
+              <a:tabLst>
+                <a:tab pos="1391285" algn="l"/>
+              </a:tabLst>
+            </a:pPr>
+            <a:endParaRPr lang="en-US" sz="1600" dirty="0">
+              <a:effectLst/>
+              <a:ea typeface="Calibri" panose="020F0502020204030204" pitchFamily="34" charset="0"/>
+              <a:cs typeface="Times New Roman" panose="02020603050405020304" pitchFamily="18" charset="0"/>
+            </a:endParaRPr>
+          </a:p>
+          <a:p>
+            <a:pPr marL="342900" indent="-342900">
+              <a:buFont typeface="+mj-lt"/>
+              <a:buAutoNum type="arabicPeriod"/>
+            </a:pPr>
+            <a:endParaRPr lang="en-US" sz="1800" dirty="0">
+              <a:effectLst/>
+              <a:latin typeface="Calibri" panose="020F0502020204030204" pitchFamily="34" charset="0"/>
+              <a:ea typeface="Calibri" panose="020F0502020204030204" pitchFamily="34" charset="0"/>
+              <a:cs typeface="Times New Roman" panose="02020603050405020304" pitchFamily="18" charset="0"/>
+            </a:endParaRPr>
+          </a:p>
+          <a:p>
+            <a:pPr marL="0" indent="0">
+              <a:buNone/>
+            </a:pPr>
+            <a:endParaRPr lang="en-US" dirty="0"/>
+          </a:p>
+          <a:p>
+            <a:pPr marL="0" indent="0">
+              <a:buNone/>
+            </a:pPr>
+            <a:endParaRPr lang="en-US" dirty="0"/>
+          </a:p>
+        </p:txBody>
+      </p:sp>
+    </p:spTree>
+    <p:extLst>
+      <p:ext uri="{BB962C8B-B14F-4D97-AF65-F5344CB8AC3E}">
+        <p14:creationId xmlns:p14="http://schemas.microsoft.com/office/powerpoint/2010/main" val="3149608446"/>
+      </p:ext>
+    </p:extLst>
+  </p:cSld>
+  <p:clrMapOvr>
+    <a:masterClrMapping/>
+  </p:clrMapOvr>
+</p:sld>
+</file>
+
 <file path=ppt/theme/theme1.xml><?xml version="1.0" encoding="utf-8"?>
 <a:theme xmlns:a="http://schemas.openxmlformats.org/drawingml/2006/main" name="GradientRiseVTI">
   <a:themeElements>

</xml_diff>

<commit_message>
Third comit /Updating the machine learning mockup.pptx file
</commit_message>
<xml_diff>
--- a/machine learning mockup.pptx
+++ b/machine learning mockup.pptx
@@ -272,7 +272,7 @@
           <a:p>
             <a:fld id="{655A5808-3B61-48CC-92EF-85AC2E0DFA56}" type="datetime2">
               <a:rPr lang="en-US" smtClean="0"/>
-              <a:t>Saturday, November 6, 2021</a:t>
+              <a:t>Sunday, November 7, 2021</a:t>
             </a:fld>
             <a:endParaRPr lang="en-US"/>
           </a:p>
@@ -470,7 +470,7 @@
           <a:p>
             <a:fld id="{735E98AF-4574-4509-BF7A-519ACD5BF826}" type="datetime2">
               <a:rPr lang="en-US" smtClean="0"/>
-              <a:t>Saturday, November 6, 2021</a:t>
+              <a:t>Sunday, November 7, 2021</a:t>
             </a:fld>
             <a:endParaRPr lang="en-US"/>
           </a:p>
@@ -680,7 +680,7 @@
           <a:p>
             <a:fld id="{93DD97D4-9636-490F-85D0-E926C2B6F3B1}" type="datetime2">
               <a:rPr lang="en-US" smtClean="0"/>
-              <a:t>Saturday, November 6, 2021</a:t>
+              <a:t>Sunday, November 7, 2021</a:t>
             </a:fld>
             <a:endParaRPr lang="en-US"/>
           </a:p>
@@ -879,7 +879,7 @@
           <a:p>
             <a:fld id="{2F3AF3C6-0FD4-4939-991C-00DDE5C56815}" type="datetime2">
               <a:rPr lang="en-US" smtClean="0"/>
-              <a:t>Saturday, November 6, 2021</a:t>
+              <a:t>Sunday, November 7, 2021</a:t>
             </a:fld>
             <a:endParaRPr lang="en-US"/>
           </a:p>
@@ -1160,7 +1160,7 @@
           <a:p>
             <a:fld id="{86807482-8128-47C6-A8DD-6452B0291CFF}" type="datetime2">
               <a:rPr lang="en-US" smtClean="0"/>
-              <a:t>Saturday, November 6, 2021</a:t>
+              <a:t>Sunday, November 7, 2021</a:t>
             </a:fld>
             <a:endParaRPr lang="en-US"/>
           </a:p>
@@ -1428,7 +1428,7 @@
           <a:p>
             <a:fld id="{37903F25-275E-41DE-BE3B-EBF0DB49F9B1}" type="datetime2">
               <a:rPr lang="en-US" smtClean="0"/>
-              <a:t>Saturday, November 6, 2021</a:t>
+              <a:t>Sunday, November 7, 2021</a:t>
             </a:fld>
             <a:endParaRPr lang="en-US"/>
           </a:p>
@@ -1809,7 +1809,7 @@
           <a:p>
             <a:fld id="{EE475572-4A44-4171-84AA-64D42C8050A6}" type="datetime2">
               <a:rPr lang="en-US" smtClean="0"/>
-              <a:t>Saturday, November 6, 2021</a:t>
+              <a:t>Sunday, November 7, 2021</a:t>
             </a:fld>
             <a:endParaRPr lang="en-US"/>
           </a:p>
@@ -1979,7 +1979,7 @@
           <a:p>
             <a:fld id="{C4C1612E-528E-4FD5-9E9E-E15F1108F171}" type="datetime2">
               <a:rPr lang="en-US" smtClean="0"/>
-              <a:t>Saturday, November 6, 2021</a:t>
+              <a:t>Sunday, November 7, 2021</a:t>
             </a:fld>
             <a:endParaRPr lang="en-US"/>
           </a:p>
@@ -2092,7 +2092,7 @@
           <a:p>
             <a:fld id="{D4F6D862-A06D-436F-A92E-EBAAD50B6E50}" type="datetime2">
               <a:rPr lang="en-US" smtClean="0"/>
-              <a:t>Saturday, November 6, 2021</a:t>
+              <a:t>Sunday, November 7, 2021</a:t>
             </a:fld>
             <a:endParaRPr lang="en-US"/>
           </a:p>
@@ -2409,7 +2409,7 @@
           <a:p>
             <a:fld id="{B73E0B7D-2260-4809-8F0A-9E5F3E24F169}" type="datetime2">
               <a:rPr lang="en-US" smtClean="0"/>
-              <a:t>Saturday, November 6, 2021</a:t>
+              <a:t>Sunday, November 7, 2021</a:t>
             </a:fld>
             <a:endParaRPr lang="en-US"/>
           </a:p>
@@ -2701,7 +2701,7 @@
           <a:p>
             <a:fld id="{3C8E4735-C637-46A3-94EB-AB3AC4188D2F}" type="datetime2">
               <a:rPr lang="en-US" smtClean="0"/>
-              <a:t>Saturday, November 6, 2021</a:t>
+              <a:t>Sunday, November 7, 2021</a:t>
             </a:fld>
             <a:endParaRPr lang="en-US"/>
           </a:p>
@@ -3069,7 +3069,7 @@
             <a:fld id="{AE0C963C-C1DB-4AFD-9DDC-0691666BF49B}" type="datetime2">
               <a:rPr lang="en-US" smtClean="0"/>
               <a:pPr/>
-              <a:t>Saturday, November 6, 2021</a:t>
+              <a:t>Sunday, November 7, 2021</a:t>
             </a:fld>
             <a:endParaRPr lang="en-US" cap="all" dirty="0"/>
           </a:p>
@@ -4417,8 +4417,47 @@
                 <a:ea typeface="Calibri" panose="020F0502020204030204" pitchFamily="34" charset="0"/>
                 <a:cs typeface="Times New Roman" panose="02020603050405020304" pitchFamily="18" charset="0"/>
               </a:rPr>
-              <a:t>. Build Machine Learning Model using different algorithm </a:t>
-            </a:r>
+              <a:t>. </a:t>
+            </a:r>
+            <a:r>
+              <a:rPr lang="en-US" sz="1600" dirty="0">
+                <a:effectLst/>
+                <a:ea typeface="Calibri" panose="020F0502020204030204" pitchFamily="34" charset="0"/>
+                <a:cs typeface="Times New Roman" panose="02020603050405020304" pitchFamily="18" charset="0"/>
+              </a:rPr>
+              <a:t>Build Machine Learning Model using </a:t>
+            </a:r>
+            <a:r>
+              <a:rPr lang="en-US" sz="1600">
+                <a:effectLst/>
+                <a:ea typeface="Calibri" panose="020F0502020204030204" pitchFamily="34" charset="0"/>
+                <a:cs typeface="Times New Roman" panose="02020603050405020304" pitchFamily="18" charset="0"/>
+              </a:rPr>
+              <a:t>different algorithm: </a:t>
+            </a:r>
+            <a:r>
+              <a:rPr lang="en-US" sz="1600" b="0" i="0">
+                <a:solidFill>
+                  <a:srgbClr val="1D1C1D"/>
+                </a:solidFill>
+                <a:effectLst/>
+              </a:rPr>
+              <a:t>we </a:t>
+            </a:r>
+            <a:r>
+              <a:rPr lang="en-US" sz="1600" b="0" i="0" dirty="0">
+                <a:solidFill>
+                  <a:srgbClr val="1D1C1D"/>
+                </a:solidFill>
+                <a:effectLst/>
+              </a:rPr>
+              <a:t>will evaluate few and select one</a:t>
+            </a:r>
+            <a:endParaRPr lang="en-US" sz="1600" dirty="0">
+              <a:effectLst/>
+              <a:ea typeface="Calibri" panose="020F0502020204030204" pitchFamily="34" charset="0"/>
+              <a:cs typeface="Times New Roman" panose="02020603050405020304" pitchFamily="18" charset="0"/>
+            </a:endParaRPr>
           </a:p>
           <a:p>
             <a:pPr marL="1257300" lvl="2" indent="-342900">
@@ -4497,7 +4536,7 @@
                 <a:ea typeface="Calibri" panose="020F0502020204030204" pitchFamily="34" charset="0"/>
                 <a:cs typeface="Times New Roman" panose="02020603050405020304" pitchFamily="18" charset="0"/>
               </a:rPr>
-              <a:t>Performance evaluation: Our aim on this dataset is to achieve an accuracy score of 85% or plus.</a:t>
+              <a:t>Performance evaluation: we will choose a model with an accuracy score of 85% or plus.</a:t>
             </a:r>
           </a:p>
           <a:p>

</xml_diff>